<commit_message>
update to final verion doc
</commit_message>
<xml_diff>
--- a/doc/poster/assets/aug_picture.pptx
+++ b/doc/poster/assets/aug_picture.pptx
@@ -2977,7 +2977,7 @@
         </p:nvSpPr>
         <p:spPr>
           <a:xfrm>
-            <a:off x="774698" y="1134532"/>
+            <a:off x="1735663" y="1117600"/>
             <a:ext cx="4318002" cy="1303867"/>
           </a:xfrm>
           <a:prstGeom prst="uturnArrow">
@@ -3056,7 +3056,7 @@
         </p:nvSpPr>
         <p:spPr>
           <a:xfrm>
-            <a:off x="5659964" y="1138764"/>
+            <a:off x="6468531" y="1117599"/>
             <a:ext cx="4047068" cy="1303867"/>
           </a:xfrm>
           <a:prstGeom prst="uturnArrow">
@@ -3092,15 +3092,25 @@
             <a:pPr algn="ctr"/>
             <a:r>
               <a:rPr lang="en-US" dirty="0" smtClean="0"/>
-              <a:t>Random crop 224 -&gt; resize 256</a:t>
-            </a:r>
+              <a:t>Random </a:t>
+            </a:r>
+            <a:r>
+              <a:rPr lang="en-US" dirty="0" smtClean="0"/>
+              <a:t>crop 224 -&gt; resize 256</a:t>
+            </a:r>
+            <a:endParaRPr lang="en-US" dirty="0" smtClean="0"/>
           </a:p>
           <a:p>
             <a:pPr algn="ctr"/>
             <a:r>
               <a:rPr lang="en-US" dirty="0" smtClean="0"/>
-              <a:t>Rotation, Flip with probability</a:t>
-            </a:r>
+              <a:t>Rotation, </a:t>
+            </a:r>
+            <a:r>
+              <a:rPr lang="en-US" dirty="0" smtClean="0"/>
+              <a:t>Flip with probability</a:t>
+            </a:r>
+            <a:endParaRPr lang="en-US" dirty="0" smtClean="0"/>
           </a:p>
           <a:p>
             <a:pPr algn="ctr"/>
@@ -3172,7 +3182,7 @@
         </p:blipFill>
         <p:spPr>
           <a:xfrm>
-            <a:off x="3615265" y="2404533"/>
+            <a:off x="4428065" y="2404533"/>
             <a:ext cx="3251200" cy="3251200"/>
           </a:xfrm>
           <a:prstGeom prst="rect">
@@ -3202,7 +3212,7 @@
         </p:blipFill>
         <p:spPr>
           <a:xfrm>
-            <a:off x="6866465" y="2404533"/>
+            <a:off x="8492065" y="2404533"/>
             <a:ext cx="3251200" cy="3251200"/>
           </a:xfrm>
           <a:prstGeom prst="rect">

</xml_diff>